<commit_message>
updating the lab 1 block diagram to add the tmds and tmdsb
</commit_message>
<xml_diff>
--- a/lab/lab1/ECE383_Lab1_Block_Diagram.pptx
+++ b/lab/lab1/ECE383_Lab1_Block_Diagram.pptx
@@ -192,7 +192,7 @@
           <a:p>
             <a:fld id="{8F2FD15C-CBA0-4BCE-BE84-26287205EF6C}" type="datetimeFigureOut">
               <a:rPr lang="en-US" smtClean="0"/>
-              <a:t>1/16/2017</a:t>
+              <a:t>1/21/2017</a:t>
             </a:fld>
             <a:endParaRPr lang="en-US"/>
           </a:p>
@@ -726,7 +726,7 @@
             <a:fld id="{1D8BD707-D9CF-40AE-B4C6-C98DA3205C09}" type="datetimeFigureOut">
               <a:rPr lang="en-US" smtClean="0"/>
               <a:pPr/>
-              <a:t>1/16/2017</a:t>
+              <a:t>1/21/2017</a:t>
             </a:fld>
             <a:endParaRPr lang="en-US"/>
           </a:p>
@@ -893,7 +893,7 @@
             <a:fld id="{1D8BD707-D9CF-40AE-B4C6-C98DA3205C09}" type="datetimeFigureOut">
               <a:rPr lang="en-US" smtClean="0"/>
               <a:pPr/>
-              <a:t>1/16/2017</a:t>
+              <a:t>1/21/2017</a:t>
             </a:fld>
             <a:endParaRPr lang="en-US"/>
           </a:p>
@@ -1070,7 +1070,7 @@
             <a:fld id="{1D8BD707-D9CF-40AE-B4C6-C98DA3205C09}" type="datetimeFigureOut">
               <a:rPr lang="en-US" smtClean="0"/>
               <a:pPr/>
-              <a:t>1/16/2017</a:t>
+              <a:t>1/21/2017</a:t>
             </a:fld>
             <a:endParaRPr lang="en-US"/>
           </a:p>
@@ -1237,7 +1237,7 @@
             <a:fld id="{1D8BD707-D9CF-40AE-B4C6-C98DA3205C09}" type="datetimeFigureOut">
               <a:rPr lang="en-US" smtClean="0"/>
               <a:pPr/>
-              <a:t>1/16/2017</a:t>
+              <a:t>1/21/2017</a:t>
             </a:fld>
             <a:endParaRPr lang="en-US"/>
           </a:p>
@@ -1480,7 +1480,7 @@
             <a:fld id="{1D8BD707-D9CF-40AE-B4C6-C98DA3205C09}" type="datetimeFigureOut">
               <a:rPr lang="en-US" smtClean="0"/>
               <a:pPr/>
-              <a:t>1/16/2017</a:t>
+              <a:t>1/21/2017</a:t>
             </a:fld>
             <a:endParaRPr lang="en-US"/>
           </a:p>
@@ -1765,7 +1765,7 @@
             <a:fld id="{1D8BD707-D9CF-40AE-B4C6-C98DA3205C09}" type="datetimeFigureOut">
               <a:rPr lang="en-US" smtClean="0"/>
               <a:pPr/>
-              <a:t>1/16/2017</a:t>
+              <a:t>1/21/2017</a:t>
             </a:fld>
             <a:endParaRPr lang="en-US"/>
           </a:p>
@@ -2184,7 +2184,7 @@
             <a:fld id="{1D8BD707-D9CF-40AE-B4C6-C98DA3205C09}" type="datetimeFigureOut">
               <a:rPr lang="en-US" smtClean="0"/>
               <a:pPr/>
-              <a:t>1/16/2017</a:t>
+              <a:t>1/21/2017</a:t>
             </a:fld>
             <a:endParaRPr lang="en-US"/>
           </a:p>
@@ -2299,7 +2299,7 @@
             <a:fld id="{1D8BD707-D9CF-40AE-B4C6-C98DA3205C09}" type="datetimeFigureOut">
               <a:rPr lang="en-US" smtClean="0"/>
               <a:pPr/>
-              <a:t>1/16/2017</a:t>
+              <a:t>1/21/2017</a:t>
             </a:fld>
             <a:endParaRPr lang="en-US"/>
           </a:p>
@@ -2391,7 +2391,7 @@
             <a:fld id="{1D8BD707-D9CF-40AE-B4C6-C98DA3205C09}" type="datetimeFigureOut">
               <a:rPr lang="en-US" smtClean="0"/>
               <a:pPr/>
-              <a:t>1/16/2017</a:t>
+              <a:t>1/21/2017</a:t>
             </a:fld>
             <a:endParaRPr lang="en-US"/>
           </a:p>
@@ -2665,7 +2665,7 @@
             <a:fld id="{1D8BD707-D9CF-40AE-B4C6-C98DA3205C09}" type="datetimeFigureOut">
               <a:rPr lang="en-US" smtClean="0"/>
               <a:pPr/>
-              <a:t>1/16/2017</a:t>
+              <a:t>1/21/2017</a:t>
             </a:fld>
             <a:endParaRPr lang="en-US"/>
           </a:p>
@@ -2915,7 +2915,7 @@
             <a:fld id="{1D8BD707-D9CF-40AE-B4C6-C98DA3205C09}" type="datetimeFigureOut">
               <a:rPr lang="en-US" smtClean="0"/>
               <a:pPr/>
-              <a:t>1/16/2017</a:t>
+              <a:t>1/21/2017</a:t>
             </a:fld>
             <a:endParaRPr lang="en-US"/>
           </a:p>
@@ -3125,7 +3125,7 @@
             <a:fld id="{1D8BD707-D9CF-40AE-B4C6-C98DA3205C09}" type="datetimeFigureOut">
               <a:rPr lang="en-US" smtClean="0"/>
               <a:pPr/>
-              <a:t>1/16/2017</a:t>
+              <a:t>1/21/2017</a:t>
             </a:fld>
             <a:endParaRPr lang="en-US"/>
           </a:p>
@@ -11686,6 +11686,254 @@
             <a:r>
               <a:rPr lang="en-US" sz="1800" dirty="0" err="1" smtClean="0"/>
               <a:t>Serialize_clk</a:t>
+            </a:r>
+            <a:endParaRPr lang="en-US" sz="1800" dirty="0"/>
+          </a:p>
+        </p:txBody>
+      </p:sp>
+      <p:sp>
+        <p:nvSpPr>
+          <p:cNvPr id="269" name="TextBox 268"/>
+          <p:cNvSpPr txBox="1"/>
+          <p:nvPr/>
+        </p:nvSpPr>
+        <p:spPr>
+          <a:xfrm>
+            <a:off x="16687800" y="5505442"/>
+            <a:ext cx="988142" cy="369332"/>
+          </a:xfrm>
+          <a:prstGeom prst="rect">
+            <a:avLst/>
+          </a:prstGeom>
+          <a:noFill/>
+        </p:spPr>
+        <p:txBody>
+          <a:bodyPr wrap="square" lIns="91440" tIns="45720" rIns="91440" bIns="45720" rtlCol="0">
+            <a:spAutoFit/>
+          </a:bodyPr>
+          <a:lstStyle>
+            <a:defPPr>
+              <a:defRPr lang="en-US"/>
+            </a:defPPr>
+            <a:lvl1pPr marL="0" algn="l" defTabSz="1828800" rtl="0" eaLnBrk="1" latinLnBrk="0" hangingPunct="1">
+              <a:defRPr sz="3600" kern="1200">
+                <a:solidFill>
+                  <a:schemeClr val="tx1"/>
+                </a:solidFill>
+                <a:latin typeface="+mn-lt"/>
+                <a:ea typeface="+mn-ea"/>
+                <a:cs typeface="+mn-cs"/>
+              </a:defRPr>
+            </a:lvl1pPr>
+            <a:lvl2pPr marL="914400" algn="l" defTabSz="1828800" rtl="0" eaLnBrk="1" latinLnBrk="0" hangingPunct="1">
+              <a:defRPr sz="3600" kern="1200">
+                <a:solidFill>
+                  <a:schemeClr val="tx1"/>
+                </a:solidFill>
+                <a:latin typeface="+mn-lt"/>
+                <a:ea typeface="+mn-ea"/>
+                <a:cs typeface="+mn-cs"/>
+              </a:defRPr>
+            </a:lvl2pPr>
+            <a:lvl3pPr marL="1828800" algn="l" defTabSz="1828800" rtl="0" eaLnBrk="1" latinLnBrk="0" hangingPunct="1">
+              <a:defRPr sz="3600" kern="1200">
+                <a:solidFill>
+                  <a:schemeClr val="tx1"/>
+                </a:solidFill>
+                <a:latin typeface="+mn-lt"/>
+                <a:ea typeface="+mn-ea"/>
+                <a:cs typeface="+mn-cs"/>
+              </a:defRPr>
+            </a:lvl3pPr>
+            <a:lvl4pPr marL="2743200" algn="l" defTabSz="1828800" rtl="0" eaLnBrk="1" latinLnBrk="0" hangingPunct="1">
+              <a:defRPr sz="3600" kern="1200">
+                <a:solidFill>
+                  <a:schemeClr val="tx1"/>
+                </a:solidFill>
+                <a:latin typeface="+mn-lt"/>
+                <a:ea typeface="+mn-ea"/>
+                <a:cs typeface="+mn-cs"/>
+              </a:defRPr>
+            </a:lvl4pPr>
+            <a:lvl5pPr marL="3657600" algn="l" defTabSz="1828800" rtl="0" eaLnBrk="1" latinLnBrk="0" hangingPunct="1">
+              <a:defRPr sz="3600" kern="1200">
+                <a:solidFill>
+                  <a:schemeClr val="tx1"/>
+                </a:solidFill>
+                <a:latin typeface="+mn-lt"/>
+                <a:ea typeface="+mn-ea"/>
+                <a:cs typeface="+mn-cs"/>
+              </a:defRPr>
+            </a:lvl5pPr>
+            <a:lvl6pPr marL="4572000" algn="l" defTabSz="1828800" rtl="0" eaLnBrk="1" latinLnBrk="0" hangingPunct="1">
+              <a:defRPr sz="3600" kern="1200">
+                <a:solidFill>
+                  <a:schemeClr val="tx1"/>
+                </a:solidFill>
+                <a:latin typeface="+mn-lt"/>
+                <a:ea typeface="+mn-ea"/>
+                <a:cs typeface="+mn-cs"/>
+              </a:defRPr>
+            </a:lvl6pPr>
+            <a:lvl7pPr marL="5486400" algn="l" defTabSz="1828800" rtl="0" eaLnBrk="1" latinLnBrk="0" hangingPunct="1">
+              <a:defRPr sz="3600" kern="1200">
+                <a:solidFill>
+                  <a:schemeClr val="tx1"/>
+                </a:solidFill>
+                <a:latin typeface="+mn-lt"/>
+                <a:ea typeface="+mn-ea"/>
+                <a:cs typeface="+mn-cs"/>
+              </a:defRPr>
+            </a:lvl7pPr>
+            <a:lvl8pPr marL="6400800" algn="l" defTabSz="1828800" rtl="0" eaLnBrk="1" latinLnBrk="0" hangingPunct="1">
+              <a:defRPr sz="3600" kern="1200">
+                <a:solidFill>
+                  <a:schemeClr val="tx1"/>
+                </a:solidFill>
+                <a:latin typeface="+mn-lt"/>
+                <a:ea typeface="+mn-ea"/>
+                <a:cs typeface="+mn-cs"/>
+              </a:defRPr>
+            </a:lvl8pPr>
+            <a:lvl9pPr marL="7315200" algn="l" defTabSz="1828800" rtl="0" eaLnBrk="1" latinLnBrk="0" hangingPunct="1">
+              <a:defRPr sz="3600" kern="1200">
+                <a:solidFill>
+                  <a:schemeClr val="tx1"/>
+                </a:solidFill>
+                <a:latin typeface="+mn-lt"/>
+                <a:ea typeface="+mn-ea"/>
+                <a:cs typeface="+mn-cs"/>
+              </a:defRPr>
+            </a:lvl9pPr>
+          </a:lstStyle>
+          <a:p>
+            <a:r>
+              <a:rPr lang="en-US" sz="1800" dirty="0" err="1" smtClean="0"/>
+              <a:t>tmds</a:t>
+            </a:r>
+            <a:endParaRPr lang="en-US" sz="1800" dirty="0"/>
+          </a:p>
+        </p:txBody>
+      </p:sp>
+      <p:sp>
+        <p:nvSpPr>
+          <p:cNvPr id="271" name="TextBox 270"/>
+          <p:cNvSpPr txBox="1"/>
+          <p:nvPr/>
+        </p:nvSpPr>
+        <p:spPr>
+          <a:xfrm>
+            <a:off x="16698990" y="5879068"/>
+            <a:ext cx="988142" cy="369332"/>
+          </a:xfrm>
+          <a:prstGeom prst="rect">
+            <a:avLst/>
+          </a:prstGeom>
+          <a:noFill/>
+        </p:spPr>
+        <p:txBody>
+          <a:bodyPr wrap="square" lIns="91440" tIns="45720" rIns="91440" bIns="45720" rtlCol="0">
+            <a:spAutoFit/>
+          </a:bodyPr>
+          <a:lstStyle>
+            <a:defPPr>
+              <a:defRPr lang="en-US"/>
+            </a:defPPr>
+            <a:lvl1pPr marL="0" algn="l" defTabSz="1828800" rtl="0" eaLnBrk="1" latinLnBrk="0" hangingPunct="1">
+              <a:defRPr sz="3600" kern="1200">
+                <a:solidFill>
+                  <a:schemeClr val="tx1"/>
+                </a:solidFill>
+                <a:latin typeface="+mn-lt"/>
+                <a:ea typeface="+mn-ea"/>
+                <a:cs typeface="+mn-cs"/>
+              </a:defRPr>
+            </a:lvl1pPr>
+            <a:lvl2pPr marL="914400" algn="l" defTabSz="1828800" rtl="0" eaLnBrk="1" latinLnBrk="0" hangingPunct="1">
+              <a:defRPr sz="3600" kern="1200">
+                <a:solidFill>
+                  <a:schemeClr val="tx1"/>
+                </a:solidFill>
+                <a:latin typeface="+mn-lt"/>
+                <a:ea typeface="+mn-ea"/>
+                <a:cs typeface="+mn-cs"/>
+              </a:defRPr>
+            </a:lvl2pPr>
+            <a:lvl3pPr marL="1828800" algn="l" defTabSz="1828800" rtl="0" eaLnBrk="1" latinLnBrk="0" hangingPunct="1">
+              <a:defRPr sz="3600" kern="1200">
+                <a:solidFill>
+                  <a:schemeClr val="tx1"/>
+                </a:solidFill>
+                <a:latin typeface="+mn-lt"/>
+                <a:ea typeface="+mn-ea"/>
+                <a:cs typeface="+mn-cs"/>
+              </a:defRPr>
+            </a:lvl3pPr>
+            <a:lvl4pPr marL="2743200" algn="l" defTabSz="1828800" rtl="0" eaLnBrk="1" latinLnBrk="0" hangingPunct="1">
+              <a:defRPr sz="3600" kern="1200">
+                <a:solidFill>
+                  <a:schemeClr val="tx1"/>
+                </a:solidFill>
+                <a:latin typeface="+mn-lt"/>
+                <a:ea typeface="+mn-ea"/>
+                <a:cs typeface="+mn-cs"/>
+              </a:defRPr>
+            </a:lvl4pPr>
+            <a:lvl5pPr marL="3657600" algn="l" defTabSz="1828800" rtl="0" eaLnBrk="1" latinLnBrk="0" hangingPunct="1">
+              <a:defRPr sz="3600" kern="1200">
+                <a:solidFill>
+                  <a:schemeClr val="tx1"/>
+                </a:solidFill>
+                <a:latin typeface="+mn-lt"/>
+                <a:ea typeface="+mn-ea"/>
+                <a:cs typeface="+mn-cs"/>
+              </a:defRPr>
+            </a:lvl5pPr>
+            <a:lvl6pPr marL="4572000" algn="l" defTabSz="1828800" rtl="0" eaLnBrk="1" latinLnBrk="0" hangingPunct="1">
+              <a:defRPr sz="3600" kern="1200">
+                <a:solidFill>
+                  <a:schemeClr val="tx1"/>
+                </a:solidFill>
+                <a:latin typeface="+mn-lt"/>
+                <a:ea typeface="+mn-ea"/>
+                <a:cs typeface="+mn-cs"/>
+              </a:defRPr>
+            </a:lvl6pPr>
+            <a:lvl7pPr marL="5486400" algn="l" defTabSz="1828800" rtl="0" eaLnBrk="1" latinLnBrk="0" hangingPunct="1">
+              <a:defRPr sz="3600" kern="1200">
+                <a:solidFill>
+                  <a:schemeClr val="tx1"/>
+                </a:solidFill>
+                <a:latin typeface="+mn-lt"/>
+                <a:ea typeface="+mn-ea"/>
+                <a:cs typeface="+mn-cs"/>
+              </a:defRPr>
+            </a:lvl7pPr>
+            <a:lvl8pPr marL="6400800" algn="l" defTabSz="1828800" rtl="0" eaLnBrk="1" latinLnBrk="0" hangingPunct="1">
+              <a:defRPr sz="3600" kern="1200">
+                <a:solidFill>
+                  <a:schemeClr val="tx1"/>
+                </a:solidFill>
+                <a:latin typeface="+mn-lt"/>
+                <a:ea typeface="+mn-ea"/>
+                <a:cs typeface="+mn-cs"/>
+              </a:defRPr>
+            </a:lvl8pPr>
+            <a:lvl9pPr marL="7315200" algn="l" defTabSz="1828800" rtl="0" eaLnBrk="1" latinLnBrk="0" hangingPunct="1">
+              <a:defRPr sz="3600" kern="1200">
+                <a:solidFill>
+                  <a:schemeClr val="tx1"/>
+                </a:solidFill>
+                <a:latin typeface="+mn-lt"/>
+                <a:ea typeface="+mn-ea"/>
+                <a:cs typeface="+mn-cs"/>
+              </a:defRPr>
+            </a:lvl9pPr>
+          </a:lstStyle>
+          <a:p>
+            <a:r>
+              <a:rPr lang="en-US" sz="1800" dirty="0" err="1" smtClean="0"/>
+              <a:t>tmdsb</a:t>
             </a:r>
             <a:endParaRPr lang="en-US" sz="1800" dirty="0"/>
           </a:p>

</xml_diff>